<commit_message>
fix of A/S problem
</commit_message>
<xml_diff>
--- a/Presentation.pptx
+++ b/Presentation.pptx
@@ -5,7 +5,7 @@
     <p:sldMasterId id="2147483648" r:id="rId1"/>
   </p:sldMasterIdLst>
   <p:notesMasterIdLst>
-    <p:notesMasterId r:id="rId29"/>
+    <p:notesMasterId r:id="rId30"/>
   </p:notesMasterIdLst>
   <p:sldIdLst>
     <p:sldId id="256" r:id="rId2"/>
@@ -34,7 +34,8 @@
     <p:sldId id="283" r:id="rId25"/>
     <p:sldId id="284" r:id="rId26"/>
     <p:sldId id="285" r:id="rId27"/>
-    <p:sldId id="286" r:id="rId28"/>
+    <p:sldId id="287" r:id="rId28"/>
+    <p:sldId id="286" r:id="rId29"/>
   </p:sldIdLst>
   <p:sldSz cx="12192000" cy="6858000"/>
   <p:notesSz cx="6858000" cy="9144000"/>
@@ -9275,6 +9276,210 @@
 </file>
 
 <file path=ppt/slides/slide27.xml><?xml version="1.0" encoding="utf-8"?>
+<p:sld xmlns:a="http://schemas.openxmlformats.org/drawingml/2006/main" xmlns:r="http://schemas.openxmlformats.org/officeDocument/2006/relationships" xmlns:p="http://schemas.openxmlformats.org/presentationml/2006/main">
+  <p:cSld>
+    <p:spTree>
+      <p:nvGrpSpPr>
+        <p:cNvPr id="1" name=""/>
+        <p:cNvGrpSpPr/>
+        <p:nvPr/>
+      </p:nvGrpSpPr>
+      <p:grpSpPr>
+        <a:xfrm>
+          <a:off x="0" y="0"/>
+          <a:ext cx="0" cy="0"/>
+          <a:chOff x="0" y="0"/>
+          <a:chExt cx="0" cy="0"/>
+        </a:xfrm>
+      </p:grpSpPr>
+      <p:grpSp>
+        <p:nvGrpSpPr>
+          <p:cNvPr id="4" name="Group 3">
+            <a:extLst>
+              <a:ext uri="{FF2B5EF4-FFF2-40B4-BE49-F238E27FC236}">
+                <a16:creationId xmlns:a16="http://schemas.microsoft.com/office/drawing/2014/main" id="{102A380B-F3B8-4F53-B930-1FA9D0586065}"/>
+              </a:ext>
+            </a:extLst>
+          </p:cNvPr>
+          <p:cNvGrpSpPr/>
+          <p:nvPr/>
+        </p:nvGrpSpPr>
+        <p:grpSpPr>
+          <a:xfrm>
+            <a:off x="7487811" y="2182011"/>
+            <a:ext cx="5297585" cy="5306444"/>
+            <a:chOff x="7487811" y="2182011"/>
+            <a:chExt cx="5297585" cy="5306444"/>
+          </a:xfrm>
+        </p:grpSpPr>
+        <p:pic>
+          <p:nvPicPr>
+            <p:cNvPr id="5" name="Picture 4">
+              <a:extLst>
+                <a:ext uri="{FF2B5EF4-FFF2-40B4-BE49-F238E27FC236}">
+                  <a16:creationId xmlns:a16="http://schemas.microsoft.com/office/drawing/2014/main" id="{ABAADB5A-2902-462A-AAC2-04D214C47FFD}"/>
+                </a:ext>
+              </a:extLst>
+            </p:cNvPr>
+            <p:cNvPicPr>
+              <a:picLocks noChangeAspect="1"/>
+            </p:cNvPicPr>
+            <p:nvPr/>
+          </p:nvPicPr>
+          <p:blipFill>
+            <a:blip r:embed="rId2">
+              <a:extLst>
+                <a:ext uri="{28A0092B-C50C-407E-A947-70E740481C1C}">
+                  <a14:useLocalDpi xmlns:a14="http://schemas.microsoft.com/office/drawing/2010/main" val="0"/>
+                </a:ext>
+              </a:extLst>
+            </a:blip>
+            <a:stretch>
+              <a:fillRect/>
+            </a:stretch>
+          </p:blipFill>
+          <p:spPr>
+            <a:xfrm>
+              <a:off x="7487811" y="2182011"/>
+              <a:ext cx="5297585" cy="5297585"/>
+            </a:xfrm>
+            <a:prstGeom prst="rect">
+              <a:avLst/>
+            </a:prstGeom>
+            <a:effectLst/>
+          </p:spPr>
+        </p:pic>
+        <p:sp>
+          <p:nvSpPr>
+            <p:cNvPr id="6" name="Rectangle 5">
+              <a:extLst>
+                <a:ext uri="{FF2B5EF4-FFF2-40B4-BE49-F238E27FC236}">
+                  <a16:creationId xmlns:a16="http://schemas.microsoft.com/office/drawing/2014/main" id="{267A98D5-C2FB-4219-ADC8-9C634EC561C7}"/>
+                </a:ext>
+              </a:extLst>
+            </p:cNvPr>
+            <p:cNvSpPr/>
+            <p:nvPr/>
+          </p:nvSpPr>
+          <p:spPr>
+            <a:xfrm>
+              <a:off x="7488455" y="2184935"/>
+              <a:ext cx="5293894" cy="5303520"/>
+            </a:xfrm>
+            <a:prstGeom prst="rect">
+              <a:avLst/>
+            </a:prstGeom>
+            <a:solidFill>
+              <a:schemeClr val="bg1">
+                <a:alpha val="89000"/>
+              </a:schemeClr>
+            </a:solidFill>
+            <a:ln>
+              <a:noFill/>
+            </a:ln>
+          </p:spPr>
+          <p:style>
+            <a:lnRef idx="2">
+              <a:schemeClr val="accent1">
+                <a:shade val="50000"/>
+              </a:schemeClr>
+            </a:lnRef>
+            <a:fillRef idx="1">
+              <a:schemeClr val="accent1"/>
+            </a:fillRef>
+            <a:effectRef idx="0">
+              <a:schemeClr val="accent1"/>
+            </a:effectRef>
+            <a:fontRef idx="minor">
+              <a:schemeClr val="lt1"/>
+            </a:fontRef>
+          </p:style>
+          <p:txBody>
+            <a:bodyPr rtlCol="0" anchor="ctr"/>
+            <a:lstStyle/>
+            <a:p>
+              <a:pPr algn="ctr"/>
+              <a:endParaRPr lang="en-DK"/>
+            </a:p>
+          </p:txBody>
+        </p:sp>
+      </p:grpSp>
+      <p:sp>
+        <p:nvSpPr>
+          <p:cNvPr id="2" name="Title 1">
+            <a:extLst>
+              <a:ext uri="{FF2B5EF4-FFF2-40B4-BE49-F238E27FC236}">
+                <a16:creationId xmlns:a16="http://schemas.microsoft.com/office/drawing/2014/main" id="{98844CEC-848D-469C-A8C8-3FF629314F98}"/>
+              </a:ext>
+            </a:extLst>
+          </p:cNvPr>
+          <p:cNvSpPr>
+            <a:spLocks noGrp="1"/>
+          </p:cNvSpPr>
+          <p:nvPr>
+            <p:ph type="title"/>
+          </p:nvPr>
+        </p:nvSpPr>
+        <p:spPr/>
+        <p:txBody>
+          <a:bodyPr/>
+          <a:lstStyle/>
+          <a:p>
+            <a:r>
+              <a:rPr lang="en-US" dirty="0"/>
+              <a:t>Take away</a:t>
+            </a:r>
+            <a:endParaRPr lang="en-DK" dirty="0"/>
+          </a:p>
+        </p:txBody>
+      </p:sp>
+      <p:sp>
+        <p:nvSpPr>
+          <p:cNvPr id="3" name="Text Placeholder 2">
+            <a:extLst>
+              <a:ext uri="{FF2B5EF4-FFF2-40B4-BE49-F238E27FC236}">
+                <a16:creationId xmlns:a16="http://schemas.microsoft.com/office/drawing/2014/main" id="{7B91CD2A-7B56-4982-BC68-742FC4A10D62}"/>
+              </a:ext>
+            </a:extLst>
+          </p:cNvPr>
+          <p:cNvSpPr>
+            <a:spLocks noGrp="1"/>
+          </p:cNvSpPr>
+          <p:nvPr>
+            <p:ph type="body" idx="1"/>
+          </p:nvPr>
+        </p:nvSpPr>
+        <p:spPr/>
+        <p:txBody>
+          <a:bodyPr/>
+          <a:lstStyle/>
+          <a:p>
+            <a:r>
+              <a:rPr lang="en-US" dirty="0"/>
+              <a:t>Model your data “more” like what </a:t>
+            </a:r>
+            <a:r>
+              <a:rPr lang="en-US"/>
+              <a:t>is represents.</a:t>
+            </a:r>
+            <a:endParaRPr lang="en-DK" dirty="0"/>
+          </a:p>
+        </p:txBody>
+      </p:sp>
+    </p:spTree>
+    <p:extLst>
+      <p:ext uri="{BB962C8B-B14F-4D97-AF65-F5344CB8AC3E}">
+        <p14:creationId xmlns:p14="http://schemas.microsoft.com/office/powerpoint/2010/main" val="3865673438"/>
+      </p:ext>
+    </p:extLst>
+  </p:cSld>
+  <p:clrMapOvr>
+    <a:masterClrMapping/>
+  </p:clrMapOvr>
+</p:sld>
+</file>
+
+<file path=ppt/slides/slide28.xml><?xml version="1.0" encoding="utf-8"?>
 <p:sld xmlns:a="http://schemas.openxmlformats.org/drawingml/2006/main" xmlns:r="http://schemas.openxmlformats.org/officeDocument/2006/relationships" xmlns:p="http://schemas.openxmlformats.org/presentationml/2006/main">
   <p:cSld>
     <p:spTree>

</xml_diff>